<commit_message>
Refine flowchart and add some descript
</commit_message>
<xml_diff>
--- a/Document/SiS_I2C_Update Firmware flow_7501說明_20220518.pptx
+++ b/Document/SiS_I2C_Update Firmware flow_7501說明_20220518.pptx
@@ -3999,10 +3999,9 @@
               </a:lnSpc>
             </a:pPr>
             <a:r>
-              <a:rPr lang="en-US" altLang="zh-TW" sz="1400"/>
-              <a:t>2022/05/18</a:t>
-            </a:r>
-            <a:endParaRPr lang="en-US" altLang="zh-TW" sz="1400" dirty="0"/>
+              <a:rPr lang="en-US" altLang="zh-TW" sz="1400" dirty="0"/>
+              <a:t>2023/3/6</a:t>
+            </a:r>
           </a:p>
           <a:p>
             <a:pPr>
@@ -6936,7 +6935,7 @@
             </a:r>
             <a:r>
               <a:rPr lang="en-US" altLang="zh-TW" sz="1100" dirty="0"/>
-              <a:t>Byte4~Byte6 Byte8~pack length (</a:t>
+              <a:t>Byte6 + Byte8~pack length (</a:t>
             </a:r>
             <a:r>
               <a:rPr lang="zh-TW" altLang="en-US" sz="1100" dirty="0"/>
@@ -7113,8 +7112,8 @@
         </p:nvSpPr>
         <p:spPr>
           <a:xfrm>
-            <a:off x="3059832" y="2787774"/>
-            <a:ext cx="1080120" cy="407489"/>
+            <a:off x="3707904" y="2787774"/>
+            <a:ext cx="432048" cy="407489"/>
           </a:xfrm>
           <a:prstGeom prst="rect">
             <a:avLst/>
@@ -9189,11 +9188,23 @@
             <a:pPr lvl="1"/>
             <a:r>
               <a:rPr lang="zh-TW" altLang="en-US" sz="1600" dirty="0"/>
-              <a:t>長度是</a:t>
+              <a:t>長度是總共幾筆</a:t>
             </a:r>
             <a:r>
               <a:rPr lang="en-US" altLang="zh-TW" sz="1600" dirty="0"/>
-              <a:t>total 0x84 packet number</a:t>
+              <a:t>84 </a:t>
+            </a:r>
+            <a:r>
+              <a:rPr lang="en-US" altLang="zh-TW" sz="1600" dirty="0" err="1"/>
+              <a:t>cmd</a:t>
+            </a:r>
+            <a:r>
+              <a:rPr lang="zh-TW" altLang="en-US" sz="1600" dirty="0"/>
+              <a:t> </a:t>
+            </a:r>
+            <a:r>
+              <a:rPr lang="en-US" altLang="zh-TW" sz="1600" dirty="0"/>
+              <a:t>(packet number)</a:t>
             </a:r>
             <a:r>
               <a:rPr lang="zh-TW" altLang="en-US" sz="1600" dirty="0"/>
@@ -9201,7 +9212,7 @@
             </a:r>
             <a:r>
               <a:rPr lang="en-US" altLang="zh-TW" sz="1600" dirty="0"/>
-              <a:t> little-endian</a:t>
+              <a:t>little-endian</a:t>
             </a:r>
           </a:p>
           <a:p>
@@ -9881,7 +9892,15 @@
             </a:r>
             <a:r>
               <a:rPr lang="en-US" altLang="zh-TW" sz="1100" dirty="0"/>
-              <a:t>0x84 packets </a:t>
+              <a:t>84 command</a:t>
+            </a:r>
+            <a:r>
+              <a:rPr lang="zh-TW" altLang="en-US" sz="1100" dirty="0"/>
+              <a:t>的</a:t>
+            </a:r>
+            <a:r>
+              <a:rPr lang="en-US" altLang="zh-TW" sz="1100" dirty="0"/>
+              <a:t>packets </a:t>
             </a:r>
             <a:r>
               <a:rPr lang="zh-TW" altLang="en-US" sz="1100" dirty="0"/>
@@ -10446,7 +10465,15 @@
             </a:r>
             <a:r>
               <a:rPr lang="zh-TW" altLang="en-US" sz="1200" b="0" dirty="0"/>
-              <a:t>位置。</a:t>
+              <a:t>位置</a:t>
+            </a:r>
+            <a:r>
+              <a:rPr lang="en-US" altLang="zh-TW" sz="1200" b="0" dirty="0"/>
+              <a:t>(0x0-0x1f000)</a:t>
+            </a:r>
+            <a:r>
+              <a:rPr lang="zh-TW" altLang="en-US" sz="1200" b="0" dirty="0"/>
+              <a:t>。</a:t>
             </a:r>
             <a:endParaRPr lang="en-US" altLang="zh-TW" sz="1200" b="0" dirty="0"/>
           </a:p>

</xml_diff>